<commit_message>
Powerpoint apresentação quase terminado
</commit_message>
<xml_diff>
--- a/Apresentações/Apresentação1103.pptx
+++ b/Apresentações/Apresentação1103.pptx
@@ -7695,8 +7695,8 @@
         </p:nvSpPr>
         <p:spPr>
           <a:xfrm>
-            <a:off x="3509210" y="1696453"/>
-            <a:ext cx="5173579" cy="369332"/>
+            <a:off x="1848251" y="4051033"/>
+            <a:ext cx="7112869" cy="1323439"/>
           </a:xfrm>
           <a:prstGeom prst="rect">
             <a:avLst/>
@@ -7710,23 +7710,27 @@
           <a:lstStyle/>
           <a:p>
             <a:r>
-              <a:rPr lang="en-GB" dirty="0"/>
-              <a:t>LI4 – </a:t>
-            </a:r>
-            <a:r>
-              <a:rPr lang="en-GB" dirty="0" err="1"/>
+              <a:rPr lang="en-GB" sz="4000" b="1" dirty="0"/>
+              <a:t>LI4</a:t>
+            </a:r>
+            <a:r>
+              <a:rPr lang="en-GB" sz="4000" dirty="0"/>
+              <a:t> – </a:t>
+            </a:r>
+            <a:r>
+              <a:rPr lang="pt-PT" sz="4000" dirty="0"/>
               <a:t>Objetivos</a:t>
             </a:r>
             <a:r>
-              <a:rPr lang="en-GB" dirty="0"/>
-              <a:t> Bi-</a:t>
-            </a:r>
-            <a:r>
-              <a:rPr lang="en-GB" dirty="0" err="1"/>
-              <a:t>semanais</a:t>
-            </a:r>
-            <a:r>
-              <a:rPr lang="en-GB" dirty="0"/>
+              <a:rPr lang="en-GB" sz="4000" dirty="0"/>
+              <a:t> </a:t>
+            </a:r>
+            <a:r>
+              <a:rPr lang="pt-PT" sz="4000" dirty="0"/>
+              <a:t>Quinzenais</a:t>
+            </a:r>
+            <a:r>
+              <a:rPr lang="en-GB" sz="4000" dirty="0"/>
               <a:t> 13/03</a:t>
             </a:r>
           </a:p>
@@ -7776,8 +7780,8 @@
         </p:nvSpPr>
         <p:spPr>
           <a:xfrm>
-            <a:off x="1598997" y="780247"/>
-            <a:ext cx="3705726" cy="369332"/>
+            <a:off x="1598997" y="734527"/>
+            <a:ext cx="3705726" cy="461665"/>
           </a:xfrm>
           <a:prstGeom prst="rect">
             <a:avLst/>
@@ -7791,18 +7795,18 @@
           <a:lstStyle/>
           <a:p>
             <a:r>
-              <a:rPr lang="en-GB" dirty="0" err="1"/>
+              <a:rPr lang="en-GB" sz="2400" dirty="0" err="1"/>
               <a:t>Modelo</a:t>
             </a:r>
             <a:r>
-              <a:rPr lang="en-GB" dirty="0"/>
+              <a:rPr lang="en-GB" sz="2400" dirty="0"/>
               <a:t> </a:t>
             </a:r>
             <a:r>
-              <a:rPr lang="en-GB" dirty="0" err="1"/>
+              <a:rPr lang="en-GB" sz="2400" dirty="0" err="1"/>
               <a:t>Lógico</a:t>
             </a:r>
-            <a:endParaRPr lang="en-GB" dirty="0"/>
+            <a:endParaRPr lang="en-GB" sz="2400" dirty="0"/>
           </a:p>
         </p:txBody>
       </p:sp>
@@ -7880,8 +7884,8 @@
         </p:nvSpPr>
         <p:spPr>
           <a:xfrm>
-            <a:off x="1598997" y="780247"/>
-            <a:ext cx="3705726" cy="369332"/>
+            <a:off x="1633287" y="734527"/>
+            <a:ext cx="3705726" cy="461665"/>
           </a:xfrm>
           <a:prstGeom prst="rect">
             <a:avLst/>
@@ -7895,18 +7899,101 @@
           <a:lstStyle/>
           <a:p>
             <a:r>
-              <a:rPr lang="en-GB" dirty="0" err="1"/>
+              <a:rPr lang="en-GB" sz="2400" dirty="0" err="1"/>
               <a:t>Modelo</a:t>
             </a:r>
             <a:r>
-              <a:rPr lang="en-GB" dirty="0"/>
+              <a:rPr lang="en-GB" sz="2400" dirty="0"/>
               <a:t> </a:t>
             </a:r>
             <a:r>
-              <a:rPr lang="en-GB" dirty="0" err="1"/>
+              <a:rPr lang="en-GB" sz="2400" dirty="0" err="1"/>
               <a:t>Físico</a:t>
             </a:r>
-            <a:endParaRPr lang="en-GB" dirty="0"/>
+            <a:endParaRPr lang="en-GB" sz="2400" dirty="0"/>
+          </a:p>
+        </p:txBody>
+      </p:sp>
+      <p:sp>
+        <p:nvSpPr>
+          <p:cNvPr id="3" name="TextBox 2">
+            <a:extLst>
+              <a:ext uri="{FF2B5EF4-FFF2-40B4-BE49-F238E27FC236}">
+                <a16:creationId xmlns:a16="http://schemas.microsoft.com/office/drawing/2014/main" id="{4B12B4F1-AD09-914D-BED9-08B47D3BAAC7}"/>
+              </a:ext>
+            </a:extLst>
+          </p:cNvPr>
+          <p:cNvSpPr txBox="1"/>
+          <p:nvPr/>
+        </p:nvSpPr>
+        <p:spPr>
+          <a:xfrm>
+            <a:off x="1352550" y="1394460"/>
+            <a:ext cx="9486900" cy="1200329"/>
+          </a:xfrm>
+          <a:prstGeom prst="rect">
+            <a:avLst/>
+          </a:prstGeom>
+          <a:noFill/>
+        </p:spPr>
+        <p:txBody>
+          <a:bodyPr wrap="square" rtlCol="0">
+            <a:spAutoFit/>
+          </a:bodyPr>
+          <a:lstStyle/>
+          <a:p>
+            <a:r>
+              <a:rPr lang="pt-PT" dirty="0"/>
+              <a:t>Após a ligação à base de dados, foi gerado o Modelo Físico correspondente ao Diagrama EER que se encontra no diapositivo anterior. Todo o código foi gerado pelo </a:t>
+            </a:r>
+            <a:r>
+              <a:rPr lang="pt-PT" i="1" dirty="0" err="1"/>
+              <a:t>MySQL</a:t>
+            </a:r>
+            <a:r>
+              <a:rPr lang="pt-PT" dirty="0"/>
+              <a:t> através da </a:t>
+            </a:r>
+            <a:r>
+              <a:rPr lang="pt-PT" i="1" dirty="0" err="1"/>
+              <a:t>feature</a:t>
+            </a:r>
+            <a:r>
+              <a:rPr lang="pt-PT" dirty="0"/>
+              <a:t> de </a:t>
+            </a:r>
+            <a:r>
+              <a:rPr lang="pt-PT" i="1" dirty="0" err="1"/>
+              <a:t>forward</a:t>
+            </a:r>
+            <a:r>
+              <a:rPr lang="pt-PT" i="1" dirty="0"/>
+              <a:t> </a:t>
+            </a:r>
+            <a:r>
+              <a:rPr lang="pt-PT" i="1" dirty="0" err="1"/>
+              <a:t>engineer</a:t>
+            </a:r>
+            <a:r>
+              <a:rPr lang="pt-PT" dirty="0"/>
+              <a:t>. O código fonte encontra-se no repositório </a:t>
+            </a:r>
+            <a:r>
+              <a:rPr lang="pt-PT" dirty="0" err="1"/>
+              <a:t>Git</a:t>
+            </a:r>
+            <a:r>
+              <a:rPr lang="pt-PT" dirty="0"/>
+              <a:t> na diretoria BD em </a:t>
+            </a:r>
+            <a:r>
+              <a:rPr lang="pt-PT" i="1" dirty="0" err="1"/>
+              <a:t>ModeloFisico.sql</a:t>
+            </a:r>
+            <a:r>
+              <a:rPr lang="pt-PT" dirty="0"/>
+              <a:t>.</a:t>
+            </a:r>
           </a:p>
         </p:txBody>
       </p:sp>
@@ -7954,8 +8041,8 @@
         </p:nvSpPr>
         <p:spPr>
           <a:xfrm>
-            <a:off x="1585161" y="764005"/>
-            <a:ext cx="5414210" cy="369332"/>
+            <a:off x="1585161" y="729715"/>
+            <a:ext cx="5414210" cy="461665"/>
           </a:xfrm>
           <a:prstGeom prst="rect">
             <a:avLst/>
@@ -7969,20 +8056,107 @@
           <a:lstStyle/>
           <a:p>
             <a:r>
-              <a:rPr lang="en-GB" dirty="0" err="1"/>
+              <a:rPr lang="en-GB" sz="2400" dirty="0" err="1"/>
               <a:t>Definição</a:t>
             </a:r>
             <a:r>
-              <a:rPr lang="en-GB" dirty="0"/>
+              <a:rPr lang="en-GB" sz="2400" dirty="0"/>
               <a:t> de </a:t>
             </a:r>
             <a:r>
-              <a:rPr lang="en-GB" dirty="0" err="1"/>
+              <a:rPr lang="en-GB" sz="2400" dirty="0" err="1"/>
               <a:t>objetivos</a:t>
             </a:r>
             <a:r>
-              <a:rPr lang="en-GB" dirty="0"/>
+              <a:rPr lang="en-GB" sz="2400" dirty="0"/>
               <a:t> para 27/03</a:t>
+            </a:r>
+          </a:p>
+        </p:txBody>
+      </p:sp>
+      <p:sp>
+        <p:nvSpPr>
+          <p:cNvPr id="3" name="TextBox 2">
+            <a:extLst>
+              <a:ext uri="{FF2B5EF4-FFF2-40B4-BE49-F238E27FC236}">
+                <a16:creationId xmlns:a16="http://schemas.microsoft.com/office/drawing/2014/main" id="{CDE24A38-7EE4-1D4C-B632-89B812DFD60B}"/>
+              </a:ext>
+            </a:extLst>
+          </p:cNvPr>
+          <p:cNvSpPr txBox="1"/>
+          <p:nvPr/>
+        </p:nvSpPr>
+        <p:spPr>
+          <a:xfrm>
+            <a:off x="1764030" y="2000250"/>
+            <a:ext cx="8663940" cy="1754326"/>
+          </a:xfrm>
+          <a:prstGeom prst="rect">
+            <a:avLst/>
+          </a:prstGeom>
+          <a:noFill/>
+        </p:spPr>
+        <p:txBody>
+          <a:bodyPr wrap="square" rtlCol="0">
+            <a:spAutoFit/>
+          </a:bodyPr>
+          <a:lstStyle/>
+          <a:p>
+            <a:r>
+              <a:rPr lang="pt-PT" dirty="0"/>
+              <a:t>Para as próximas duas semanas, temos delineado o desenvolvimento do </a:t>
+            </a:r>
+            <a:r>
+              <a:rPr lang="pt-PT" i="1" dirty="0" err="1"/>
+              <a:t>Back</a:t>
+            </a:r>
+            <a:r>
+              <a:rPr lang="pt-PT" i="1" dirty="0"/>
+              <a:t> </a:t>
+            </a:r>
+            <a:r>
+              <a:rPr lang="pt-PT" i="1" dirty="0" err="1"/>
+              <a:t>End</a:t>
+            </a:r>
+            <a:r>
+              <a:rPr lang="pt-PT" i="1" dirty="0"/>
+              <a:t> </a:t>
+            </a:r>
+            <a:r>
+              <a:rPr lang="pt-PT" dirty="0"/>
+              <a:t>e da Camada de Dados. Como tal, o Peter e o Eduardo ficarão encarregues de trabalhar na Camada de Dados, e o João, o Pedro e a Rita trabalharão no </a:t>
+            </a:r>
+            <a:r>
+              <a:rPr lang="pt-PT" i="1" dirty="0" err="1"/>
+              <a:t>Back</a:t>
+            </a:r>
+            <a:r>
+              <a:rPr lang="pt-PT" i="1" dirty="0"/>
+              <a:t> </a:t>
+            </a:r>
+            <a:r>
+              <a:rPr lang="pt-PT" i="1" dirty="0" err="1"/>
+              <a:t>End</a:t>
+            </a:r>
+            <a:r>
+              <a:rPr lang="pt-PT" dirty="0"/>
+              <a:t>. Como tal, esperaremos daqui a duas semanas apresentar alguma da algoritmia relacionada com o </a:t>
+            </a:r>
+            <a:r>
+              <a:rPr lang="pt-PT" i="1" dirty="0" err="1"/>
+              <a:t>Back</a:t>
+            </a:r>
+            <a:r>
+              <a:rPr lang="pt-PT" i="1" dirty="0"/>
+              <a:t> </a:t>
+            </a:r>
+            <a:r>
+              <a:rPr lang="pt-PT" i="1" dirty="0" err="1"/>
+              <a:t>End</a:t>
+            </a:r>
+            <a:r>
+              <a:rPr lang="pt-PT" dirty="0"/>
+              <a:t>, bem como a ligação perfeitamente funcional à base de dados em SQL.</a:t>
             </a:r>
           </a:p>
         </p:txBody>
@@ -8032,7 +8206,7 @@
         <p:spPr>
           <a:xfrm>
             <a:off x="1606817" y="752576"/>
-            <a:ext cx="3272590" cy="369332"/>
+            <a:ext cx="3272590" cy="461665"/>
           </a:xfrm>
           <a:prstGeom prst="rect">
             <a:avLst/>
@@ -8046,21 +8220,50 @@
           <a:lstStyle/>
           <a:p>
             <a:r>
-              <a:rPr lang="en-GB" dirty="0" err="1"/>
+              <a:rPr lang="pt-PT" sz="2400" dirty="0"/>
               <a:t>Modelo</a:t>
             </a:r>
             <a:r>
-              <a:rPr lang="en-GB" dirty="0"/>
+              <a:rPr lang="en-GB" sz="2400" dirty="0"/>
               <a:t> de </a:t>
             </a:r>
             <a:r>
-              <a:rPr lang="en-GB" dirty="0" err="1"/>
+              <a:rPr lang="pt-PT" sz="2400" dirty="0"/>
               <a:t>Domínio</a:t>
             </a:r>
-            <a:endParaRPr lang="en-GB" dirty="0"/>
-          </a:p>
-        </p:txBody>
-      </p:sp>
+          </a:p>
+        </p:txBody>
+      </p:sp>
+      <p:pic>
+        <p:nvPicPr>
+          <p:cNvPr id="4" name="Picture 3" descr="A close up of a map&#10;&#10;Description automatically generated">
+            <a:extLst>
+              <a:ext uri="{FF2B5EF4-FFF2-40B4-BE49-F238E27FC236}">
+                <a16:creationId xmlns:a16="http://schemas.microsoft.com/office/drawing/2014/main" id="{40C6E51C-DF15-9748-9074-183806FCA43B}"/>
+              </a:ext>
+            </a:extLst>
+          </p:cNvPr>
+          <p:cNvPicPr>
+            <a:picLocks noChangeAspect="1"/>
+          </p:cNvPicPr>
+          <p:nvPr/>
+        </p:nvPicPr>
+        <p:blipFill>
+          <a:blip r:embed="rId2"/>
+          <a:stretch>
+            <a:fillRect/>
+          </a:stretch>
+        </p:blipFill>
+        <p:spPr>
+          <a:xfrm>
+            <a:off x="1387548" y="2125749"/>
+            <a:ext cx="6983717" cy="3979675"/>
+          </a:xfrm>
+          <a:prstGeom prst="rect">
+            <a:avLst/>
+          </a:prstGeom>
+        </p:spPr>
+      </p:pic>
     </p:spTree>
     <p:extLst>
       <p:ext uri="{BB962C8B-B14F-4D97-AF65-F5344CB8AC3E}">
@@ -8106,7 +8309,7 @@
         <p:spPr>
           <a:xfrm>
             <a:off x="1564707" y="756786"/>
-            <a:ext cx="4331368" cy="369332"/>
+            <a:ext cx="4331368" cy="461665"/>
           </a:xfrm>
           <a:prstGeom prst="rect">
             <a:avLst/>
@@ -8120,17 +8323,142 @@
           <a:lstStyle/>
           <a:p>
             <a:r>
-              <a:rPr lang="en-GB" dirty="0"/>
+              <a:rPr lang="en-GB" sz="2400" dirty="0"/>
               <a:t>Use Cases </a:t>
             </a:r>
             <a:r>
-              <a:rPr lang="en-GB" dirty="0" err="1"/>
+              <a:rPr lang="en-GB" sz="2400" dirty="0" err="1"/>
               <a:t>Atualizados</a:t>
             </a:r>
-            <a:endParaRPr lang="en-GB" dirty="0"/>
-          </a:p>
-        </p:txBody>
-      </p:sp>
+            <a:endParaRPr lang="en-GB" sz="2400" dirty="0"/>
+          </a:p>
+        </p:txBody>
+      </p:sp>
+      <p:sp>
+        <p:nvSpPr>
+          <p:cNvPr id="3" name="TextBox 2">
+            <a:extLst>
+              <a:ext uri="{FF2B5EF4-FFF2-40B4-BE49-F238E27FC236}">
+                <a16:creationId xmlns:a16="http://schemas.microsoft.com/office/drawing/2014/main" id="{C15D1D8E-BCCC-D14E-B0D6-DE1C9BB90165}"/>
+              </a:ext>
+            </a:extLst>
+          </p:cNvPr>
+          <p:cNvSpPr txBox="1"/>
+          <p:nvPr/>
+        </p:nvSpPr>
+        <p:spPr>
+          <a:xfrm>
+            <a:off x="711251" y="1935824"/>
+            <a:ext cx="5254818" cy="1477328"/>
+          </a:xfrm>
+          <a:prstGeom prst="rect">
+            <a:avLst/>
+          </a:prstGeom>
+          <a:noFill/>
+        </p:spPr>
+        <p:txBody>
+          <a:bodyPr wrap="square" rtlCol="0">
+            <a:spAutoFit/>
+          </a:bodyPr>
+          <a:lstStyle/>
+          <a:p>
+            <a:r>
+              <a:rPr lang="pt-PT" dirty="0"/>
+              <a:t>Devido às alterações que fizemos ao diagrama de classes, foi necessário alterar o Use Case “Solicitar Visita” e adicionar dois Use Cases novos, “Iniciar Visita” e “Terminar Visita”.</a:t>
+            </a:r>
+          </a:p>
+        </p:txBody>
+      </p:sp>
+      <p:pic>
+        <p:nvPicPr>
+          <p:cNvPr id="5" name="Picture 4" descr="A screenshot of a cell phone&#10;&#10;Description automatically generated">
+            <a:extLst>
+              <a:ext uri="{FF2B5EF4-FFF2-40B4-BE49-F238E27FC236}">
+                <a16:creationId xmlns:a16="http://schemas.microsoft.com/office/drawing/2014/main" id="{D7B903B1-9587-C54B-B319-69FE86581B6B}"/>
+              </a:ext>
+            </a:extLst>
+          </p:cNvPr>
+          <p:cNvPicPr>
+            <a:picLocks noChangeAspect="1"/>
+          </p:cNvPicPr>
+          <p:nvPr/>
+        </p:nvPicPr>
+        <p:blipFill>
+          <a:blip r:embed="rId2"/>
+          <a:stretch>
+            <a:fillRect/>
+          </a:stretch>
+        </p:blipFill>
+        <p:spPr>
+          <a:xfrm>
+            <a:off x="6225933" y="1443260"/>
+            <a:ext cx="4692383" cy="1692893"/>
+          </a:xfrm>
+          <a:prstGeom prst="rect">
+            <a:avLst/>
+          </a:prstGeom>
+        </p:spPr>
+      </p:pic>
+      <p:pic>
+        <p:nvPicPr>
+          <p:cNvPr id="7" name="Picture 6" descr="A screenshot of a cell phone&#10;&#10;Description automatically generated">
+            <a:extLst>
+              <a:ext uri="{FF2B5EF4-FFF2-40B4-BE49-F238E27FC236}">
+                <a16:creationId xmlns:a16="http://schemas.microsoft.com/office/drawing/2014/main" id="{E4A1DE0F-B207-C54A-91A0-1E1994B87CC5}"/>
+              </a:ext>
+            </a:extLst>
+          </p:cNvPr>
+          <p:cNvPicPr>
+            <a:picLocks noChangeAspect="1"/>
+          </p:cNvPicPr>
+          <p:nvPr/>
+        </p:nvPicPr>
+        <p:blipFill>
+          <a:blip r:embed="rId3"/>
+          <a:stretch>
+            <a:fillRect/>
+          </a:stretch>
+        </p:blipFill>
+        <p:spPr>
+          <a:xfrm>
+            <a:off x="6586595" y="3429000"/>
+            <a:ext cx="4038207" cy="2836999"/>
+          </a:xfrm>
+          <a:prstGeom prst="rect">
+            <a:avLst/>
+          </a:prstGeom>
+        </p:spPr>
+      </p:pic>
+      <p:pic>
+        <p:nvPicPr>
+          <p:cNvPr id="9" name="Picture 8" descr="A screenshot of a cell phone&#10;&#10;Description automatically generated">
+            <a:extLst>
+              <a:ext uri="{FF2B5EF4-FFF2-40B4-BE49-F238E27FC236}">
+                <a16:creationId xmlns:a16="http://schemas.microsoft.com/office/drawing/2014/main" id="{B05A6549-93C6-9346-BCA7-2A1F8717F9DD}"/>
+              </a:ext>
+            </a:extLst>
+          </p:cNvPr>
+          <p:cNvPicPr>
+            <a:picLocks noChangeAspect="1"/>
+          </p:cNvPicPr>
+          <p:nvPr/>
+        </p:nvPicPr>
+        <p:blipFill>
+          <a:blip r:embed="rId4"/>
+          <a:stretch>
+            <a:fillRect/>
+          </a:stretch>
+        </p:blipFill>
+        <p:spPr>
+          <a:xfrm>
+            <a:off x="1071914" y="3629233"/>
+            <a:ext cx="4533493" cy="2704672"/>
+          </a:xfrm>
+          <a:prstGeom prst="rect">
+            <a:avLst/>
+          </a:prstGeom>
+        </p:spPr>
+      </p:pic>
     </p:spTree>
     <p:extLst>
       <p:ext uri="{BB962C8B-B14F-4D97-AF65-F5344CB8AC3E}">
@@ -8420,8 +8748,8 @@
         </p:nvSpPr>
         <p:spPr>
           <a:xfrm>
-            <a:off x="1619450" y="786865"/>
-            <a:ext cx="5238549" cy="369332"/>
+            <a:off x="1573730" y="737898"/>
+            <a:ext cx="7284520" cy="461665"/>
           </a:xfrm>
           <a:prstGeom prst="rect">
             <a:avLst/>
@@ -8435,27 +8763,27 @@
           <a:lstStyle/>
           <a:p>
             <a:r>
-              <a:rPr lang="en-GB" dirty="0" err="1"/>
+              <a:rPr lang="en-GB" sz="2400" dirty="0" err="1"/>
               <a:t>Ativação</a:t>
             </a:r>
             <a:r>
-              <a:rPr lang="en-GB" dirty="0"/>
+              <a:rPr lang="en-GB" sz="2400" dirty="0"/>
               <a:t> da </a:t>
             </a:r>
             <a:r>
-              <a:rPr lang="en-GB" dirty="0" err="1"/>
+              <a:rPr lang="en-GB" sz="2400" dirty="0" err="1"/>
               <a:t>Tecnologia</a:t>
             </a:r>
             <a:r>
-              <a:rPr lang="en-GB" dirty="0"/>
+              <a:rPr lang="en-GB" sz="2400" dirty="0"/>
               <a:t> – </a:t>
             </a:r>
             <a:r>
-              <a:rPr lang="en-GB" dirty="0" err="1"/>
+              <a:rPr lang="en-GB" sz="2400" dirty="0" err="1"/>
               <a:t>Javascript</a:t>
             </a:r>
             <a:r>
-              <a:rPr lang="en-GB" dirty="0"/>
+              <a:rPr lang="en-GB" sz="2400" dirty="0"/>
               <a:t> e React</a:t>
             </a:r>
           </a:p>
@@ -8644,8 +8972,8 @@
         </p:nvSpPr>
         <p:spPr>
           <a:xfrm>
-            <a:off x="1619450" y="786865"/>
-            <a:ext cx="5238549" cy="369332"/>
+            <a:off x="1619450" y="775435"/>
+            <a:ext cx="6975910" cy="461665"/>
           </a:xfrm>
           <a:prstGeom prst="rect">
             <a:avLst/>
@@ -8659,27 +8987,27 @@
           <a:lstStyle/>
           <a:p>
             <a:r>
-              <a:rPr lang="en-GB" dirty="0" err="1"/>
+              <a:rPr lang="en-GB" sz="2400" dirty="0" err="1"/>
               <a:t>Ativação</a:t>
             </a:r>
             <a:r>
-              <a:rPr lang="en-GB" dirty="0"/>
+              <a:rPr lang="en-GB" sz="2400" dirty="0"/>
               <a:t> da </a:t>
             </a:r>
             <a:r>
-              <a:rPr lang="en-GB" dirty="0" err="1"/>
+              <a:rPr lang="en-GB" sz="2400" dirty="0" err="1"/>
               <a:t>Tecnologia</a:t>
             </a:r>
             <a:r>
-              <a:rPr lang="en-GB" dirty="0"/>
+              <a:rPr lang="en-GB" sz="2400" dirty="0"/>
               <a:t> – </a:t>
             </a:r>
             <a:r>
-              <a:rPr lang="en-GB" dirty="0" err="1"/>
+              <a:rPr lang="en-GB" sz="2400" dirty="0" err="1"/>
               <a:t>Javascript</a:t>
             </a:r>
             <a:r>
-              <a:rPr lang="en-GB" dirty="0"/>
+              <a:rPr lang="en-GB" sz="2400" dirty="0"/>
               <a:t> e React</a:t>
             </a:r>
           </a:p>
@@ -8755,15 +9083,7 @@
             </a:r>
             <a:r>
               <a:rPr lang="pt-PT" dirty="0"/>
-              <a:t>no formulário de registo não funciona. No entanto, o </a:t>
-            </a:r>
-            <a:r>
-              <a:rPr lang="pt-PT" dirty="0" err="1"/>
-              <a:t>butão</a:t>
-            </a:r>
-            <a:r>
-              <a:rPr lang="pt-PT" dirty="0"/>
-              <a:t> </a:t>
+              <a:t>no formulário de registo não funciona. No entanto, o botão </a:t>
             </a:r>
             <a:r>
               <a:rPr lang="pt-PT" i="1" dirty="0"/>
@@ -8893,8 +9213,8 @@
         </p:nvSpPr>
         <p:spPr>
           <a:xfrm>
-            <a:off x="1598997" y="780247"/>
-            <a:ext cx="3705726" cy="369332"/>
+            <a:off x="1598996" y="780247"/>
+            <a:ext cx="5053263" cy="461665"/>
           </a:xfrm>
           <a:prstGeom prst="rect">
             <a:avLst/>
@@ -8908,19 +9228,19 @@
           <a:lstStyle/>
           <a:p>
             <a:r>
-              <a:rPr lang="en-GB" dirty="0" err="1"/>
+              <a:rPr lang="en-GB" sz="2400" dirty="0" err="1"/>
               <a:t>Ativação</a:t>
             </a:r>
             <a:r>
-              <a:rPr lang="en-GB" dirty="0"/>
+              <a:rPr lang="en-GB" sz="2400" dirty="0"/>
               <a:t> da </a:t>
             </a:r>
             <a:r>
-              <a:rPr lang="en-GB" dirty="0" err="1"/>
+              <a:rPr lang="en-GB" sz="2400" dirty="0" err="1"/>
               <a:t>Tecnologia</a:t>
             </a:r>
             <a:r>
-              <a:rPr lang="en-GB" dirty="0"/>
+              <a:rPr lang="en-GB" sz="2400" dirty="0"/>
               <a:t> – C#</a:t>
             </a:r>
           </a:p>
@@ -8992,15 +9312,7 @@
             </a:r>
             <a:r>
               <a:rPr lang="pt-PT" dirty="0"/>
-              <a:t>. Todo o código fonte em C# feito nesta fase está no repositório do GitHub em /</a:t>
-            </a:r>
-            <a:r>
-              <a:rPr lang="pt-PT" dirty="0" err="1"/>
-              <a:t>Codigo</a:t>
-            </a:r>
-            <a:r>
-              <a:rPr lang="pt-PT" dirty="0"/>
-              <a:t>/</a:t>
+              <a:t>. Todo o código fonte em C# feito nesta fase está no repositório do GitHub em /Código/</a:t>
             </a:r>
             <a:r>
               <a:rPr lang="pt-PT" dirty="0" err="1"/>
@@ -9059,7 +9371,7 @@
         <p:spPr>
           <a:xfrm>
             <a:off x="1598997" y="780247"/>
-            <a:ext cx="3705726" cy="369332"/>
+            <a:ext cx="3705726" cy="461665"/>
           </a:xfrm>
           <a:prstGeom prst="rect">
             <a:avLst/>
@@ -9073,11 +9385,11 @@
           <a:lstStyle/>
           <a:p>
             <a:r>
-              <a:rPr lang="en-GB" dirty="0" err="1"/>
+              <a:rPr lang="en-GB" sz="2400" dirty="0" err="1"/>
               <a:t>Modelo</a:t>
             </a:r>
             <a:r>
-              <a:rPr lang="en-GB" dirty="0"/>
+              <a:rPr lang="en-GB" sz="2400" dirty="0"/>
               <a:t> Conceptual</a:t>
             </a:r>
           </a:p>

</xml_diff>